<commit_message>
First edit of 3.1 complete
</commit_message>
<xml_diff>
--- a/Word/RawImageFiles/3-1-AOTFExperimentSetUp.pptx
+++ b/Word/RawImageFiles/3-1-AOTFExperimentSetUp.pptx
@@ -104,6 +104,22 @@
       </a:defRPr>
     </a:lvl9pPr>
   </p:defaultTextStyle>
+  <p:extLst>
+    <p:ext uri="{EFAFB233-063F-42B5-8137-9DF3F51BA10A}">
+      <p15:sldGuideLst xmlns:p15="http://schemas.microsoft.com/office/powerpoint/2012/main">
+        <p15:guide id="1" orient="horz" pos="1078">
+          <p15:clr>
+            <a:srgbClr val="A4A3A4"/>
+          </p15:clr>
+        </p15:guide>
+        <p15:guide id="2" pos="1021">
+          <p15:clr>
+            <a:srgbClr val="A4A3A4"/>
+          </p15:clr>
+        </p15:guide>
+      </p15:sldGuideLst>
+    </p:ext>
+  </p:extLst>
 </p:presentation>
 </file>
 
@@ -288,7 +304,7 @@
           <a:p>
             <a:fld id="{4AF22930-5344-406B-B25B-8C82C038D55F}" type="datetimeFigureOut">
               <a:rPr lang="en-CA" smtClean="0"/>
-              <a:t>17/12/2012</a:t>
+              <a:t>31/08/2015</a:t>
             </a:fld>
             <a:endParaRPr lang="en-CA"/>
           </a:p>
@@ -458,7 +474,7 @@
           <a:p>
             <a:fld id="{4AF22930-5344-406B-B25B-8C82C038D55F}" type="datetimeFigureOut">
               <a:rPr lang="en-CA" smtClean="0"/>
-              <a:t>17/12/2012</a:t>
+              <a:t>31/08/2015</a:t>
             </a:fld>
             <a:endParaRPr lang="en-CA"/>
           </a:p>
@@ -638,7 +654,7 @@
           <a:p>
             <a:fld id="{4AF22930-5344-406B-B25B-8C82C038D55F}" type="datetimeFigureOut">
               <a:rPr lang="en-CA" smtClean="0"/>
-              <a:t>17/12/2012</a:t>
+              <a:t>31/08/2015</a:t>
             </a:fld>
             <a:endParaRPr lang="en-CA"/>
           </a:p>
@@ -808,7 +824,7 @@
           <a:p>
             <a:fld id="{4AF22930-5344-406B-B25B-8C82C038D55F}" type="datetimeFigureOut">
               <a:rPr lang="en-CA" smtClean="0"/>
-              <a:t>17/12/2012</a:t>
+              <a:t>31/08/2015</a:t>
             </a:fld>
             <a:endParaRPr lang="en-CA"/>
           </a:p>
@@ -1054,7 +1070,7 @@
           <a:p>
             <a:fld id="{4AF22930-5344-406B-B25B-8C82C038D55F}" type="datetimeFigureOut">
               <a:rPr lang="en-CA" smtClean="0"/>
-              <a:t>17/12/2012</a:t>
+              <a:t>31/08/2015</a:t>
             </a:fld>
             <a:endParaRPr lang="en-CA"/>
           </a:p>
@@ -1342,7 +1358,7 @@
           <a:p>
             <a:fld id="{4AF22930-5344-406B-B25B-8C82C038D55F}" type="datetimeFigureOut">
               <a:rPr lang="en-CA" smtClean="0"/>
-              <a:t>17/12/2012</a:t>
+              <a:t>31/08/2015</a:t>
             </a:fld>
             <a:endParaRPr lang="en-CA"/>
           </a:p>
@@ -1764,7 +1780,7 @@
           <a:p>
             <a:fld id="{4AF22930-5344-406B-B25B-8C82C038D55F}" type="datetimeFigureOut">
               <a:rPr lang="en-CA" smtClean="0"/>
-              <a:t>17/12/2012</a:t>
+              <a:t>31/08/2015</a:t>
             </a:fld>
             <a:endParaRPr lang="en-CA"/>
           </a:p>
@@ -1882,7 +1898,7 @@
           <a:p>
             <a:fld id="{4AF22930-5344-406B-B25B-8C82C038D55F}" type="datetimeFigureOut">
               <a:rPr lang="en-CA" smtClean="0"/>
-              <a:t>17/12/2012</a:t>
+              <a:t>31/08/2015</a:t>
             </a:fld>
             <a:endParaRPr lang="en-CA"/>
           </a:p>
@@ -1977,7 +1993,7 @@
           <a:p>
             <a:fld id="{4AF22930-5344-406B-B25B-8C82C038D55F}" type="datetimeFigureOut">
               <a:rPr lang="en-CA" smtClean="0"/>
-              <a:t>17/12/2012</a:t>
+              <a:t>31/08/2015</a:t>
             </a:fld>
             <a:endParaRPr lang="en-CA"/>
           </a:p>
@@ -2254,7 +2270,7 @@
           <a:p>
             <a:fld id="{4AF22930-5344-406B-B25B-8C82C038D55F}" type="datetimeFigureOut">
               <a:rPr lang="en-CA" smtClean="0"/>
-              <a:t>17/12/2012</a:t>
+              <a:t>31/08/2015</a:t>
             </a:fld>
             <a:endParaRPr lang="en-CA"/>
           </a:p>
@@ -2507,7 +2523,7 @@
           <a:p>
             <a:fld id="{4AF22930-5344-406B-B25B-8C82C038D55F}" type="datetimeFigureOut">
               <a:rPr lang="en-CA" smtClean="0"/>
-              <a:t>17/12/2012</a:t>
+              <a:t>31/08/2015</a:t>
             </a:fld>
             <a:endParaRPr lang="en-CA"/>
           </a:p>
@@ -2720,7 +2736,7 @@
           <a:p>
             <a:fld id="{4AF22930-5344-406B-B25B-8C82C038D55F}" type="datetimeFigureOut">
               <a:rPr lang="en-CA" smtClean="0"/>
-              <a:t>17/12/2012</a:t>
+              <a:t>31/08/2015</a:t>
             </a:fld>
             <a:endParaRPr lang="en-CA"/>
           </a:p>
@@ -4928,9 +4944,9 @@
           <p:nvPr/>
         </p:nvCxnSpPr>
         <p:spPr>
-          <a:xfrm>
-            <a:off x="1995512" y="1848150"/>
-            <a:ext cx="1071574" cy="318741"/>
+          <a:xfrm flipV="1">
+            <a:off x="1995512" y="1798111"/>
+            <a:ext cx="1136700" cy="50039"/>
           </a:xfrm>
           <a:prstGeom prst="line">
             <a:avLst/>
@@ -4956,50 +4972,6 @@
       </p:cxnSp>
       <p:sp>
         <p:nvSpPr>
-          <p:cNvPr id="580" name="Arc 579"/>
-          <p:cNvSpPr/>
-          <p:nvPr/>
-        </p:nvSpPr>
-        <p:spPr>
-          <a:xfrm>
-            <a:off x="2473165" y="1820359"/>
-            <a:ext cx="94138" cy="184143"/>
-          </a:xfrm>
-          <a:prstGeom prst="arc">
-            <a:avLst>
-              <a:gd name="adj1" fmla="val 16480420"/>
-              <a:gd name="adj2" fmla="val 5296888"/>
-            </a:avLst>
-          </a:prstGeom>
-          <a:ln>
-            <a:prstDash val="solid"/>
-          </a:ln>
-        </p:spPr>
-        <p:style>
-          <a:lnRef idx="1">
-            <a:schemeClr val="dk1"/>
-          </a:lnRef>
-          <a:fillRef idx="0">
-            <a:schemeClr val="dk1"/>
-          </a:fillRef>
-          <a:effectRef idx="0">
-            <a:schemeClr val="dk1"/>
-          </a:effectRef>
-          <a:fontRef idx="minor">
-            <a:schemeClr val="tx1"/>
-          </a:fontRef>
-        </p:style>
-        <p:txBody>
-          <a:bodyPr rtlCol="0" anchor="ctr"/>
-          <a:lstStyle/>
-          <a:p>
-            <a:pPr algn="ctr"/>
-            <a:endParaRPr lang="en-CA"/>
-          </a:p>
-        </p:txBody>
-      </p:sp>
-      <p:sp>
-        <p:nvSpPr>
           <p:cNvPr id="581" name="TextBox 580"/>
           <p:cNvSpPr txBox="1"/>
           <p:nvPr/>
@@ -5036,7 +5008,7 @@
         </p:nvSpPr>
         <p:spPr>
           <a:xfrm>
-            <a:off x="2540670" y="1762690"/>
+            <a:off x="2796212" y="1576409"/>
             <a:ext cx="432048" cy="276999"/>
           </a:xfrm>
           <a:prstGeom prst="rect">
@@ -5052,7 +5024,11 @@
           <a:p>
             <a:r>
               <a:rPr lang="el-GR" sz="1200" dirty="0" smtClean="0"/>
-              <a:t>φ</a:t>
+              <a:t>θ</a:t>
+            </a:r>
+            <a:r>
+              <a:rPr lang="en-CA" sz="1200" baseline="-25000" dirty="0" smtClean="0"/>
+              <a:t>d</a:t>
             </a:r>
             <a:endParaRPr lang="en-CA" sz="1200" baseline="-25000" dirty="0"/>
           </a:p>
@@ -5113,7 +5089,10 @@
               <a:rPr lang="el-GR" sz="1200" dirty="0" smtClean="0"/>
               <a:t>θ</a:t>
             </a:r>
-            <a:endParaRPr lang="en-CA" sz="1200" baseline="-25000" dirty="0"/>
+            <a:r>
+              <a:rPr lang="en-CA" sz="1200" baseline="-25000" dirty="0"/>
+              <a:t>i</a:t>
+            </a:r>
           </a:p>
         </p:txBody>
       </p:sp>
@@ -5321,6 +5300,47 @@
             <a:avLst>
               <a:gd name="adj1" fmla="val 5527858"/>
               <a:gd name="adj2" fmla="val 15850908"/>
+            </a:avLst>
+          </a:prstGeom>
+        </p:spPr>
+        <p:style>
+          <a:lnRef idx="1">
+            <a:schemeClr val="dk1"/>
+          </a:lnRef>
+          <a:fillRef idx="0">
+            <a:schemeClr val="dk1"/>
+          </a:fillRef>
+          <a:effectRef idx="0">
+            <a:schemeClr val="dk1"/>
+          </a:effectRef>
+          <a:fontRef idx="minor">
+            <a:schemeClr val="tx1"/>
+          </a:fontRef>
+        </p:style>
+        <p:txBody>
+          <a:bodyPr rtlCol="0" anchor="ctr"/>
+          <a:lstStyle/>
+          <a:p>
+            <a:pPr algn="ctr"/>
+            <a:endParaRPr lang="en-CA"/>
+          </a:p>
+        </p:txBody>
+      </p:sp>
+      <p:sp>
+        <p:nvSpPr>
+          <p:cNvPr id="3" name="Arc 2"/>
+          <p:cNvSpPr/>
+          <p:nvPr/>
+        </p:nvSpPr>
+        <p:spPr>
+          <a:xfrm>
+            <a:off x="1906346" y="1353056"/>
+            <a:ext cx="914400" cy="914400"/>
+          </a:xfrm>
+          <a:prstGeom prst="arc">
+            <a:avLst>
+              <a:gd name="adj1" fmla="val 20683006"/>
+              <a:gd name="adj2" fmla="val 33872"/>
             </a:avLst>
           </a:prstGeom>
         </p:spPr>

</xml_diff>

<commit_message>
Completed converstion of 3.3.1
</commit_message>
<xml_diff>
--- a/Word/RawImageFiles/3-1-AOTFExperimentSetUp.pptx
+++ b/Word/RawImageFiles/3-1-AOTFExperimentSetUp.pptx
@@ -304,7 +304,7 @@
           <a:p>
             <a:fld id="{4AF22930-5344-406B-B25B-8C82C038D55F}" type="datetimeFigureOut">
               <a:rPr lang="en-CA" smtClean="0"/>
-              <a:t>31/08/2015</a:t>
+              <a:t>09/09/2015</a:t>
             </a:fld>
             <a:endParaRPr lang="en-CA"/>
           </a:p>
@@ -474,7 +474,7 @@
           <a:p>
             <a:fld id="{4AF22930-5344-406B-B25B-8C82C038D55F}" type="datetimeFigureOut">
               <a:rPr lang="en-CA" smtClean="0"/>
-              <a:t>31/08/2015</a:t>
+              <a:t>09/09/2015</a:t>
             </a:fld>
             <a:endParaRPr lang="en-CA"/>
           </a:p>
@@ -654,7 +654,7 @@
           <a:p>
             <a:fld id="{4AF22930-5344-406B-B25B-8C82C038D55F}" type="datetimeFigureOut">
               <a:rPr lang="en-CA" smtClean="0"/>
-              <a:t>31/08/2015</a:t>
+              <a:t>09/09/2015</a:t>
             </a:fld>
             <a:endParaRPr lang="en-CA"/>
           </a:p>
@@ -824,7 +824,7 @@
           <a:p>
             <a:fld id="{4AF22930-5344-406B-B25B-8C82C038D55F}" type="datetimeFigureOut">
               <a:rPr lang="en-CA" smtClean="0"/>
-              <a:t>31/08/2015</a:t>
+              <a:t>09/09/2015</a:t>
             </a:fld>
             <a:endParaRPr lang="en-CA"/>
           </a:p>
@@ -1070,7 +1070,7 @@
           <a:p>
             <a:fld id="{4AF22930-5344-406B-B25B-8C82C038D55F}" type="datetimeFigureOut">
               <a:rPr lang="en-CA" smtClean="0"/>
-              <a:t>31/08/2015</a:t>
+              <a:t>09/09/2015</a:t>
             </a:fld>
             <a:endParaRPr lang="en-CA"/>
           </a:p>
@@ -1358,7 +1358,7 @@
           <a:p>
             <a:fld id="{4AF22930-5344-406B-B25B-8C82C038D55F}" type="datetimeFigureOut">
               <a:rPr lang="en-CA" smtClean="0"/>
-              <a:t>31/08/2015</a:t>
+              <a:t>09/09/2015</a:t>
             </a:fld>
             <a:endParaRPr lang="en-CA"/>
           </a:p>
@@ -1780,7 +1780,7 @@
           <a:p>
             <a:fld id="{4AF22930-5344-406B-B25B-8C82C038D55F}" type="datetimeFigureOut">
               <a:rPr lang="en-CA" smtClean="0"/>
-              <a:t>31/08/2015</a:t>
+              <a:t>09/09/2015</a:t>
             </a:fld>
             <a:endParaRPr lang="en-CA"/>
           </a:p>
@@ -1898,7 +1898,7 @@
           <a:p>
             <a:fld id="{4AF22930-5344-406B-B25B-8C82C038D55F}" type="datetimeFigureOut">
               <a:rPr lang="en-CA" smtClean="0"/>
-              <a:t>31/08/2015</a:t>
+              <a:t>09/09/2015</a:t>
             </a:fld>
             <a:endParaRPr lang="en-CA"/>
           </a:p>
@@ -1993,7 +1993,7 @@
           <a:p>
             <a:fld id="{4AF22930-5344-406B-B25B-8C82C038D55F}" type="datetimeFigureOut">
               <a:rPr lang="en-CA" smtClean="0"/>
-              <a:t>31/08/2015</a:t>
+              <a:t>09/09/2015</a:t>
             </a:fld>
             <a:endParaRPr lang="en-CA"/>
           </a:p>
@@ -2270,7 +2270,7 @@
           <a:p>
             <a:fld id="{4AF22930-5344-406B-B25B-8C82C038D55F}" type="datetimeFigureOut">
               <a:rPr lang="en-CA" smtClean="0"/>
-              <a:t>31/08/2015</a:t>
+              <a:t>09/09/2015</a:t>
             </a:fld>
             <a:endParaRPr lang="en-CA"/>
           </a:p>
@@ -2523,7 +2523,7 @@
           <a:p>
             <a:fld id="{4AF22930-5344-406B-B25B-8C82C038D55F}" type="datetimeFigureOut">
               <a:rPr lang="en-CA" smtClean="0"/>
-              <a:t>31/08/2015</a:t>
+              <a:t>09/09/2015</a:t>
             </a:fld>
             <a:endParaRPr lang="en-CA"/>
           </a:p>
@@ -2736,7 +2736,7 @@
           <a:p>
             <a:fld id="{4AF22930-5344-406B-B25B-8C82C038D55F}" type="datetimeFigureOut">
               <a:rPr lang="en-CA" smtClean="0"/>
-              <a:t>31/08/2015</a:t>
+              <a:t>09/09/2015</a:t>
             </a:fld>
             <a:endParaRPr lang="en-CA"/>
           </a:p>
@@ -4944,9 +4944,9 @@
           <p:nvPr/>
         </p:nvCxnSpPr>
         <p:spPr>
-          <a:xfrm flipV="1">
-            <a:off x="1995512" y="1798111"/>
-            <a:ext cx="1136700" cy="50039"/>
+          <a:xfrm>
+            <a:off x="1995512" y="1815951"/>
+            <a:ext cx="1136700" cy="1"/>
           </a:xfrm>
           <a:prstGeom prst="line">
             <a:avLst/>

</xml_diff>